<commit_message>
ppt 2 small change
</commit_message>
<xml_diff>
--- a/Applied Data Science - 02.pptx
+++ b/Applied Data Science - 02.pptx
@@ -9,10 +9,10 @@
   </p:notesMasterIdLst>
   <p:sldIdLst>
     <p:sldId id="256" r:id="rId2"/>
-    <p:sldId id="314" r:id="rId3"/>
-    <p:sldId id="322" r:id="rId4"/>
-    <p:sldId id="309" r:id="rId5"/>
-    <p:sldId id="310" r:id="rId6"/>
+    <p:sldId id="322" r:id="rId3"/>
+    <p:sldId id="309" r:id="rId4"/>
+    <p:sldId id="310" r:id="rId5"/>
+    <p:sldId id="314" r:id="rId6"/>
     <p:sldId id="311" r:id="rId7"/>
     <p:sldId id="312" r:id="rId8"/>
     <p:sldId id="313" r:id="rId9"/>
@@ -4395,13 +4395,13 @@
   <p:clrMapOvr>
     <a:masterClrMapping/>
   </p:clrMapOvr>
-  <mc:AlternateContent xmlns:mc="http://schemas.openxmlformats.org/markup-compatibility/2006">
-    <mc:Choice xmlns:p14="http://schemas.microsoft.com/office/powerpoint/2010/main" Requires="p14">
+  <mc:AlternateContent xmlns:mc="http://schemas.openxmlformats.org/markup-compatibility/2006" xmlns:p14="http://schemas.microsoft.com/office/powerpoint/2010/main">
+    <mc:Choice Requires="p14">
       <p:transition spd="med" p14:dur="700">
         <p:fade/>
       </p:transition>
     </mc:Choice>
-    <mc:Fallback>
+    <mc:Fallback xmlns="">
       <p:transition spd="med">
         <p:fade/>
       </p:transition>
@@ -5055,7 +5055,7 @@
       </p:grpSpPr>
       <p:sp>
         <p:nvSpPr>
-          <p:cNvPr id="4" name="Title 3"/>
+          <p:cNvPr id="2" name="Title 1"/>
           <p:cNvSpPr>
             <a:spLocks noGrp="1"/>
           </p:cNvSpPr>
@@ -5070,7 +5070,7 @@
           <a:p>
             <a:r>
               <a:rPr lang="en-US" dirty="0" smtClean="0"/>
-              <a:t>Python Crash Course - Review</a:t>
+              <a:t>Platform Setup @ HOME</a:t>
             </a:r>
             <a:endParaRPr lang="en-US" dirty="0"/>
           </a:p>
@@ -5078,22 +5078,147 @@
       </p:sp>
       <p:sp>
         <p:nvSpPr>
-          <p:cNvPr id="2" name="Text Placeholder 1"/>
-          <p:cNvSpPr>
-            <a:spLocks noGrp="1"/>
-          </p:cNvSpPr>
-          <p:nvPr>
-            <p:ph type="body" idx="1"/>
+          <p:cNvPr id="3" name="Content Placeholder 2"/>
+          <p:cNvSpPr>
+            <a:spLocks noGrp="1"/>
+          </p:cNvSpPr>
+          <p:nvPr>
+            <p:ph idx="1"/>
           </p:nvPr>
         </p:nvSpPr>
         <p:spPr/>
         <p:txBody>
-          <a:bodyPr/>
-          <a:lstStyle/>
-          <a:p>
+          <a:bodyPr>
+            <a:normAutofit fontScale="92500" lnSpcReduction="20000"/>
+          </a:bodyPr>
+          <a:lstStyle/>
+          <a:p>
+            <a:pPr marL="514350" indent="-514350">
+              <a:lnSpc>
+                <a:spcPct val="120000"/>
+              </a:lnSpc>
+              <a:spcBef>
+                <a:spcPts val="0"/>
+              </a:spcBef>
+              <a:spcAft>
+                <a:spcPts val="600"/>
+              </a:spcAft>
+              <a:buFont typeface="+mj-lt"/>
+              <a:buAutoNum type="arabicPeriod"/>
+            </a:pPr>
+            <a:r>
+              <a:rPr lang="en-US" dirty="0"/>
+              <a:t>Install </a:t>
+            </a:r>
+            <a:r>
+              <a:rPr lang="en-US" dirty="0" smtClean="0">
+                <a:hlinkClick r:id="rId2"/>
+              </a:rPr>
+              <a:t>Anaconda</a:t>
+            </a:r>
             <a:r>
               <a:rPr lang="en-US" dirty="0" smtClean="0"/>
-              <a:t>Review in class of a </a:t>
+              <a:t> on your laptop</a:t>
+            </a:r>
+          </a:p>
+          <a:p>
+            <a:pPr marL="514350" indent="-514350">
+              <a:lnSpc>
+                <a:spcPct val="120000"/>
+              </a:lnSpc>
+              <a:spcBef>
+                <a:spcPts val="0"/>
+              </a:spcBef>
+              <a:spcAft>
+                <a:spcPts val="600"/>
+              </a:spcAft>
+              <a:buFont typeface="+mj-lt"/>
+              <a:buAutoNum type="arabicPeriod"/>
+            </a:pPr>
+            <a:r>
+              <a:rPr lang="en-US" dirty="0" smtClean="0"/>
+              <a:t>Open the Anaconda Prompt </a:t>
+            </a:r>
+          </a:p>
+          <a:p>
+            <a:pPr marL="514350" indent="-514350">
+              <a:lnSpc>
+                <a:spcPct val="120000"/>
+              </a:lnSpc>
+              <a:spcBef>
+                <a:spcPts val="0"/>
+              </a:spcBef>
+              <a:spcAft>
+                <a:spcPts val="600"/>
+              </a:spcAft>
+              <a:buFont typeface="+mj-lt"/>
+              <a:buAutoNum type="arabicPeriod"/>
+            </a:pPr>
+            <a:r>
+              <a:rPr lang="en-US" dirty="0" smtClean="0"/>
+              <a:t>Clone the course </a:t>
+            </a:r>
+            <a:r>
+              <a:rPr lang="en-US" dirty="0" err="1" smtClean="0"/>
+              <a:t>Git</a:t>
+            </a:r>
+            <a:r>
+              <a:rPr lang="en-US" dirty="0" smtClean="0"/>
+              <a:t> repo to your local machine</a:t>
+            </a:r>
+            <a:br>
+              <a:rPr lang="en-US" dirty="0" smtClean="0"/>
+            </a:br>
+            <a:r>
+              <a:rPr lang="en-US" dirty="0" smtClean="0"/>
+              <a:t>	</a:t>
+            </a:r>
+            <a:r>
+              <a:rPr lang="en-US" sz="1800" i="1" dirty="0" smtClean="0"/>
+              <a:t>$ </a:t>
+            </a:r>
+            <a:r>
+              <a:rPr lang="en-US" sz="1800" i="1" dirty="0" err="1" smtClean="0"/>
+              <a:t>git</a:t>
+            </a:r>
+            <a:r>
+              <a:rPr lang="en-US" sz="1800" i="1" dirty="0" smtClean="0"/>
+              <a:t> </a:t>
+            </a:r>
+            <a:r>
+              <a:rPr lang="en-US" sz="1800" i="1" dirty="0"/>
+              <a:t>clone </a:t>
+            </a:r>
+            <a:r>
+              <a:rPr lang="en-US" sz="1800" i="1" dirty="0" smtClean="0"/>
+              <a:t>github.com/</a:t>
+            </a:r>
+            <a:r>
+              <a:rPr lang="en-US" sz="1800" i="1" dirty="0" err="1" smtClean="0"/>
+              <a:t>omriallouche</a:t>
+            </a:r>
+            <a:r>
+              <a:rPr lang="en-US" sz="1800" i="1" dirty="0" smtClean="0"/>
+              <a:t>/applied-data-science</a:t>
+            </a:r>
+          </a:p>
+          <a:p>
+            <a:pPr marL="457200" indent="-457200">
+              <a:lnSpc>
+                <a:spcPct val="120000"/>
+              </a:lnSpc>
+              <a:spcBef>
+                <a:spcPts val="0"/>
+              </a:spcBef>
+              <a:spcAft>
+                <a:spcPts val="600"/>
+              </a:spcAft>
+              <a:buFont typeface="+mj-lt"/>
+              <a:buAutoNum type="arabicPeriod"/>
+            </a:pPr>
+            <a:r>
+              <a:rPr lang="en-US" dirty="0" smtClean="0"/>
+              <a:t>Open the </a:t>
             </a:r>
             <a:r>
               <a:rPr lang="en-US" dirty="0" err="1" smtClean="0"/>
@@ -5101,16 +5226,161 @@
             </a:r>
             <a:r>
               <a:rPr lang="en-US" dirty="0" smtClean="0"/>
-              <a:t> Notebook.</a:t>
-            </a:r>
-            <a:endParaRPr lang="he-IL" dirty="0"/>
+              <a:t> Notebook server</a:t>
+            </a:r>
+            <a:br>
+              <a:rPr lang="en-US" dirty="0" smtClean="0"/>
+            </a:br>
+            <a:r>
+              <a:rPr lang="en-US" sz="1800" i="1" dirty="0"/>
+              <a:t>	</a:t>
+            </a:r>
+            <a:r>
+              <a:rPr lang="en-US" sz="1800" i="1" dirty="0" smtClean="0"/>
+              <a:t>$ </a:t>
+            </a:r>
+            <a:r>
+              <a:rPr lang="en-US" sz="1800" i="1" dirty="0" err="1" smtClean="0"/>
+              <a:t>jupyter</a:t>
+            </a:r>
+            <a:r>
+              <a:rPr lang="en-US" sz="1800" i="1" dirty="0" smtClean="0"/>
+              <a:t> notebook</a:t>
+            </a:r>
+          </a:p>
+          <a:p>
+            <a:pPr marL="514350" indent="-514350">
+              <a:lnSpc>
+                <a:spcPct val="120000"/>
+              </a:lnSpc>
+              <a:spcBef>
+                <a:spcPts val="0"/>
+              </a:spcBef>
+              <a:spcAft>
+                <a:spcPts val="600"/>
+              </a:spcAft>
+              <a:buFont typeface="+mj-lt"/>
+              <a:buAutoNum type="arabicPeriod"/>
+            </a:pPr>
+            <a:r>
+              <a:rPr lang="en-US" dirty="0"/>
+              <a:t>Familiarize yourself with </a:t>
+            </a:r>
+            <a:r>
+              <a:rPr lang="en-US" dirty="0" err="1"/>
+              <a:t>Jupyter</a:t>
+            </a:r>
+            <a:r>
+              <a:rPr lang="en-US" dirty="0"/>
+              <a:t> Notebooks. Get to know:</a:t>
+            </a:r>
+          </a:p>
+          <a:p>
+            <a:pPr marL="914400" lvl="1" indent="-457200">
+              <a:lnSpc>
+                <a:spcPct val="120000"/>
+              </a:lnSpc>
+              <a:spcBef>
+                <a:spcPts val="0"/>
+              </a:spcBef>
+              <a:spcAft>
+                <a:spcPts val="600"/>
+              </a:spcAft>
+              <a:buFont typeface="+mj-lt"/>
+              <a:buAutoNum type="arabicPeriod"/>
+            </a:pPr>
+            <a:r>
+              <a:rPr lang="en-US" u="sng" dirty="0">
+                <a:hlinkClick r:id="rId3"/>
+              </a:rPr>
+              <a:t>Keyboard Shortcuts</a:t>
+            </a:r>
+            <a:endParaRPr lang="en-US" dirty="0"/>
+          </a:p>
+          <a:p>
+            <a:pPr marL="914400" lvl="1" indent="-457200">
+              <a:lnSpc>
+                <a:spcPct val="120000"/>
+              </a:lnSpc>
+              <a:spcBef>
+                <a:spcPts val="0"/>
+              </a:spcBef>
+              <a:spcAft>
+                <a:spcPts val="600"/>
+              </a:spcAft>
+              <a:buFont typeface="+mj-lt"/>
+              <a:buAutoNum type="arabicPeriod"/>
+            </a:pPr>
+            <a:r>
+              <a:rPr lang="en-US" u="sng" dirty="0">
+                <a:hlinkClick r:id="rId4"/>
+              </a:rPr>
+              <a:t>Markdown syntax</a:t>
+            </a:r>
+            <a:endParaRPr lang="en-US" dirty="0"/>
+          </a:p>
+          <a:p>
+            <a:pPr marL="457200" indent="-457200">
+              <a:lnSpc>
+                <a:spcPct val="120000"/>
+              </a:lnSpc>
+              <a:spcBef>
+                <a:spcPts val="0"/>
+              </a:spcBef>
+              <a:spcAft>
+                <a:spcPts val="600"/>
+              </a:spcAft>
+              <a:buFont typeface="+mj-lt"/>
+              <a:buAutoNum type="arabicPeriod"/>
+            </a:pPr>
+            <a:r>
+              <a:rPr lang="en-US" dirty="0" smtClean="0"/>
+              <a:t>Follow </a:t>
+            </a:r>
+            <a:r>
+              <a:rPr lang="en-US" dirty="0" err="1"/>
+              <a:t>Scikit</a:t>
+            </a:r>
+            <a:r>
+              <a:rPr lang="en-US" dirty="0"/>
+              <a:t> </a:t>
+            </a:r>
+            <a:r>
+              <a:rPr lang="en-US" dirty="0" err="1"/>
+              <a:t>Learn’s</a:t>
+            </a:r>
+            <a:r>
+              <a:rPr lang="en-US" dirty="0"/>
+              <a:t> basic </a:t>
+            </a:r>
+            <a:r>
+              <a:rPr lang="en-US" u="sng" dirty="0">
+                <a:hlinkClick r:id="rId5"/>
+              </a:rPr>
+              <a:t>Introduction to Machine Learning</a:t>
+            </a:r>
+            <a:r>
+              <a:rPr lang="en-US" dirty="0"/>
+              <a:t> (make sure you run the code yourself, using </a:t>
+            </a:r>
+            <a:r>
+              <a:rPr lang="en-US" dirty="0" err="1"/>
+              <a:t>Jupyter</a:t>
+            </a:r>
+            <a:r>
+              <a:rPr lang="en-US" dirty="0"/>
+              <a:t> Notebook!)</a:t>
+            </a:r>
+          </a:p>
+          <a:p>
+            <a:endParaRPr lang="en-US" dirty="0"/>
           </a:p>
         </p:txBody>
       </p:sp>
     </p:spTree>
     <p:extLst>
       <p:ext uri="{BB962C8B-B14F-4D97-AF65-F5344CB8AC3E}">
-        <p14:creationId xmlns:p14="http://schemas.microsoft.com/office/powerpoint/2010/main" val="307297003"/>
+        <p14:creationId xmlns:p14="http://schemas.microsoft.com/office/powerpoint/2010/main" val="1974155054"/>
       </p:ext>
     </p:extLst>
   </p:cSld>
@@ -5173,7 +5443,7 @@
           <a:p>
             <a:r>
               <a:rPr lang="en-US" dirty="0" smtClean="0"/>
-              <a:t>Platform Setup @ HOME</a:t>
+              <a:t>Homework – part 1</a:t>
             </a:r>
             <a:endParaRPr lang="en-US" dirty="0"/>
           </a:p>
@@ -5192,7 +5462,7 @@
         <p:spPr/>
         <p:txBody>
           <a:bodyPr>
-            <a:normAutofit fontScale="92500" lnSpcReduction="20000"/>
+            <a:normAutofit/>
           </a:bodyPr>
           <a:lstStyle/>
           <a:p>
@@ -5210,18 +5480,39 @@
               <a:buAutoNum type="arabicPeriod"/>
             </a:pPr>
             <a:r>
-              <a:rPr lang="en-US" dirty="0"/>
-              <a:t>Install </a:t>
+              <a:rPr lang="en-US" dirty="0" smtClean="0"/>
+              <a:t>Watch 3 Project Videos submitted for Harvard’s CS109 (search YouTube for “CS109”). Email </a:t>
             </a:r>
             <a:r>
               <a:rPr lang="en-US" dirty="0" smtClean="0">
                 <a:hlinkClick r:id="rId2"/>
               </a:rPr>
-              <a:t>Anaconda</a:t>
+              <a:t>omri.allouche@gmail.com</a:t>
             </a:r>
             <a:r>
               <a:rPr lang="en-US" dirty="0" smtClean="0"/>
-              <a:t> on your laptop</a:t>
+              <a:t> with a list of terms from each video, each marked with:</a:t>
+            </a:r>
+            <a:br>
+              <a:rPr lang="en-US" dirty="0" smtClean="0"/>
+            </a:br>
+            <a:r>
+              <a:rPr lang="en-US" sz="1800" dirty="0" smtClean="0"/>
+              <a:t>	1 – don’t know anything about it</a:t>
+            </a:r>
+            <a:br>
+              <a:rPr lang="en-US" sz="1800" dirty="0" smtClean="0"/>
+            </a:br>
+            <a:r>
+              <a:rPr lang="en-US" sz="1800" dirty="0" smtClean="0"/>
+              <a:t>	2 – have a vague idea what it is</a:t>
+            </a:r>
+            <a:br>
+              <a:rPr lang="en-US" sz="1800" dirty="0" smtClean="0"/>
+            </a:br>
+            <a:r>
+              <a:rPr lang="en-US" sz="1800" dirty="0" smtClean="0"/>
+              <a:t>	3 – I know it pretty well</a:t>
             </a:r>
           </a:p>
           <a:p>
@@ -5240,11 +5531,40 @@
             </a:pPr>
             <a:r>
               <a:rPr lang="en-US" dirty="0" smtClean="0"/>
-              <a:t>Open the Anaconda Prompt </a:t>
-            </a:r>
-          </a:p>
-          <a:p>
-            <a:pPr marL="514350" indent="-514350">
+              <a:t>Complete &amp; review the </a:t>
+            </a:r>
+            <a:r>
+              <a:rPr lang="en-US" dirty="0"/>
+              <a:t>Exercises </a:t>
+            </a:r>
+            <a:r>
+              <a:rPr lang="en-US" dirty="0" err="1"/>
+              <a:t>Jupyter</a:t>
+            </a:r>
+            <a:r>
+              <a:rPr lang="en-US" dirty="0"/>
+              <a:t> Notebooks for </a:t>
+            </a:r>
+            <a:r>
+              <a:rPr lang="en-US" dirty="0">
+                <a:hlinkClick r:id="rId3"/>
+              </a:rPr>
+              <a:t>Python</a:t>
+            </a:r>
+            <a:r>
+              <a:rPr lang="en-US" dirty="0"/>
+              <a:t>, </a:t>
+            </a:r>
+            <a:r>
+              <a:rPr lang="en-US" dirty="0" err="1">
+                <a:hlinkClick r:id="rId4"/>
+              </a:rPr>
+              <a:t>Numpy</a:t>
+            </a:r>
+            <a:endParaRPr lang="en-US" dirty="0"/>
+          </a:p>
+          <a:p>
+            <a:pPr marL="173736" lvl="1" indent="0">
               <a:lnSpc>
                 <a:spcPct val="120000"/>
               </a:lnSpc>
@@ -5254,249 +5574,29 @@
               <a:spcAft>
                 <a:spcPts val="600"/>
               </a:spcAft>
-              <a:buFont typeface="+mj-lt"/>
-              <a:buAutoNum type="arabicPeriod"/>
+              <a:buNone/>
             </a:pPr>
-            <a:r>
-              <a:rPr lang="en-US" dirty="0" smtClean="0"/>
-              <a:t>Clone the course </a:t>
-            </a:r>
-            <a:r>
-              <a:rPr lang="en-US" dirty="0" err="1" smtClean="0"/>
-              <a:t>Git</a:t>
-            </a:r>
-            <a:r>
-              <a:rPr lang="en-US" dirty="0" smtClean="0"/>
-              <a:t> repo to your local machine</a:t>
-            </a:r>
-            <a:br>
-              <a:rPr lang="en-US" dirty="0" smtClean="0"/>
-            </a:br>
-            <a:r>
-              <a:rPr lang="en-US" dirty="0" smtClean="0"/>
-              <a:t>	</a:t>
-            </a:r>
-            <a:r>
-              <a:rPr lang="en-US" sz="1800" i="1" dirty="0" smtClean="0"/>
-              <a:t>$ </a:t>
-            </a:r>
-            <a:r>
-              <a:rPr lang="en-US" sz="1800" i="1" dirty="0" err="1" smtClean="0"/>
-              <a:t>git</a:t>
-            </a:r>
-            <a:r>
-              <a:rPr lang="en-US" sz="1800" i="1" dirty="0" smtClean="0"/>
-              <a:t> </a:t>
-            </a:r>
-            <a:r>
-              <a:rPr lang="en-US" sz="1800" i="1" dirty="0"/>
-              <a:t>clone </a:t>
-            </a:r>
-            <a:r>
-              <a:rPr lang="en-US" sz="1800" i="1" dirty="0" smtClean="0"/>
-              <a:t>github.com/</a:t>
-            </a:r>
-            <a:r>
-              <a:rPr lang="en-US" sz="1800" i="1" dirty="0" err="1" smtClean="0"/>
-              <a:t>omriallouche</a:t>
-            </a:r>
-            <a:r>
-              <a:rPr lang="en-US" sz="1800" i="1" dirty="0" smtClean="0"/>
-              <a:t>/applied-data-science</a:t>
-            </a:r>
-          </a:p>
-          <a:p>
-            <a:pPr marL="457200" indent="-457200">
-              <a:lnSpc>
-                <a:spcPct val="120000"/>
-              </a:lnSpc>
-              <a:spcBef>
-                <a:spcPts val="0"/>
-              </a:spcBef>
-              <a:spcAft>
-                <a:spcPts val="600"/>
-              </a:spcAft>
-              <a:buFont typeface="+mj-lt"/>
-              <a:buAutoNum type="arabicPeriod"/>
-            </a:pPr>
-            <a:r>
-              <a:rPr lang="en-US" dirty="0" smtClean="0"/>
-              <a:t>Open the </a:t>
-            </a:r>
-            <a:r>
-              <a:rPr lang="en-US" dirty="0" err="1" smtClean="0"/>
-              <a:t>Jupyter</a:t>
-            </a:r>
-            <a:r>
-              <a:rPr lang="en-US" dirty="0" smtClean="0"/>
-              <a:t> Notebook server</a:t>
-            </a:r>
-            <a:br>
-              <a:rPr lang="en-US" dirty="0" smtClean="0"/>
-            </a:br>
-            <a:r>
-              <a:rPr lang="en-US" sz="1800" i="1" dirty="0"/>
-              <a:t>	</a:t>
-            </a:r>
-            <a:r>
-              <a:rPr lang="en-US" sz="1800" i="1" dirty="0" smtClean="0"/>
-              <a:t>$ </a:t>
-            </a:r>
-            <a:r>
-              <a:rPr lang="en-US" sz="1800" i="1" dirty="0" err="1" smtClean="0"/>
-              <a:t>jupyter</a:t>
-            </a:r>
-            <a:r>
-              <a:rPr lang="en-US" sz="1800" i="1" dirty="0" smtClean="0"/>
-              <a:t> notebook</a:t>
-            </a:r>
-          </a:p>
-          <a:p>
-            <a:pPr marL="514350" indent="-514350">
-              <a:lnSpc>
-                <a:spcPct val="120000"/>
-              </a:lnSpc>
-              <a:spcBef>
-                <a:spcPts val="0"/>
-              </a:spcBef>
-              <a:spcAft>
-                <a:spcPts val="600"/>
-              </a:spcAft>
-              <a:buFont typeface="+mj-lt"/>
-              <a:buAutoNum type="arabicPeriod"/>
-            </a:pPr>
-            <a:r>
-              <a:rPr lang="en-US" dirty="0"/>
-              <a:t>Familiarize yourself with </a:t>
-            </a:r>
-            <a:r>
-              <a:rPr lang="en-US" dirty="0" err="1"/>
-              <a:t>Jupyter</a:t>
-            </a:r>
-            <a:r>
-              <a:rPr lang="en-US" dirty="0"/>
-              <a:t> Notebooks. Get to know:</a:t>
-            </a:r>
-          </a:p>
-          <a:p>
-            <a:pPr marL="914400" lvl="1" indent="-457200">
-              <a:lnSpc>
-                <a:spcPct val="120000"/>
-              </a:lnSpc>
-              <a:spcBef>
-                <a:spcPts val="0"/>
-              </a:spcBef>
-              <a:spcAft>
-                <a:spcPts val="600"/>
-              </a:spcAft>
-              <a:buFont typeface="+mj-lt"/>
-              <a:buAutoNum type="arabicPeriod"/>
-            </a:pPr>
-            <a:r>
-              <a:rPr lang="en-US" u="sng" dirty="0">
-                <a:hlinkClick r:id="rId3"/>
-              </a:rPr>
-              <a:t>Keyboard Shortcuts</a:t>
-            </a:r>
-            <a:endParaRPr lang="en-US" dirty="0"/>
-          </a:p>
-          <a:p>
-            <a:pPr marL="914400" lvl="1" indent="-457200">
-              <a:lnSpc>
-                <a:spcPct val="120000"/>
-              </a:lnSpc>
-              <a:spcBef>
-                <a:spcPts val="0"/>
-              </a:spcBef>
-              <a:spcAft>
-                <a:spcPts val="600"/>
-              </a:spcAft>
-              <a:buFont typeface="+mj-lt"/>
-              <a:buAutoNum type="arabicPeriod"/>
-            </a:pPr>
-            <a:r>
-              <a:rPr lang="en-US" u="sng" dirty="0">
-                <a:hlinkClick r:id="rId4"/>
-              </a:rPr>
-              <a:t>Markdown syntax</a:t>
-            </a:r>
-            <a:endParaRPr lang="en-US" dirty="0"/>
-          </a:p>
-          <a:p>
-            <a:pPr marL="457200" indent="-457200">
-              <a:lnSpc>
-                <a:spcPct val="120000"/>
-              </a:lnSpc>
-              <a:spcBef>
-                <a:spcPts val="0"/>
-              </a:spcBef>
-              <a:spcAft>
-                <a:spcPts val="600"/>
-              </a:spcAft>
-              <a:buFont typeface="+mj-lt"/>
-              <a:buAutoNum type="arabicPeriod"/>
-            </a:pPr>
-            <a:r>
-              <a:rPr lang="en-US" dirty="0" smtClean="0"/>
-              <a:t>Follow </a:t>
-            </a:r>
-            <a:r>
-              <a:rPr lang="en-US" dirty="0" err="1"/>
-              <a:t>Scikit</a:t>
-            </a:r>
-            <a:r>
-              <a:rPr lang="en-US" dirty="0"/>
-              <a:t> </a:t>
-            </a:r>
-            <a:r>
-              <a:rPr lang="en-US" dirty="0" err="1"/>
-              <a:t>Learn’s</a:t>
-            </a:r>
-            <a:r>
-              <a:rPr lang="en-US" dirty="0"/>
-              <a:t> basic </a:t>
-            </a:r>
-            <a:r>
-              <a:rPr lang="en-US" u="sng" dirty="0">
-                <a:hlinkClick r:id="rId5"/>
-              </a:rPr>
-              <a:t>Introduction to Machine Learning</a:t>
-            </a:r>
-            <a:r>
-              <a:rPr lang="en-US" dirty="0"/>
-              <a:t> (make sure you run the code yourself, using </a:t>
-            </a:r>
-            <a:r>
-              <a:rPr lang="en-US" dirty="0" err="1"/>
-              <a:t>Jupyter</a:t>
-            </a:r>
-            <a:r>
-              <a:rPr lang="en-US" dirty="0"/>
-              <a:t> Notebook!)</a:t>
-            </a:r>
-          </a:p>
-          <a:p>
-            <a:endParaRPr lang="en-US" dirty="0"/>
+            <a:endParaRPr lang="en-US" dirty="0" smtClean="0"/>
           </a:p>
         </p:txBody>
       </p:sp>
     </p:spTree>
     <p:extLst>
       <p:ext uri="{BB962C8B-B14F-4D97-AF65-F5344CB8AC3E}">
-        <p14:creationId xmlns:p14="http://schemas.microsoft.com/office/powerpoint/2010/main" val="1974155054"/>
+        <p14:creationId xmlns:p14="http://schemas.microsoft.com/office/powerpoint/2010/main" val="3071495404"/>
       </p:ext>
     </p:extLst>
   </p:cSld>
   <p:clrMapOvr>
     <a:masterClrMapping/>
   </p:clrMapOvr>
-  <mc:AlternateContent xmlns:mc="http://schemas.openxmlformats.org/markup-compatibility/2006">
-    <mc:Choice xmlns:p14="http://schemas.microsoft.com/office/powerpoint/2010/main" Requires="p14">
+  <mc:AlternateContent xmlns:mc="http://schemas.openxmlformats.org/markup-compatibility/2006" xmlns:p14="http://schemas.microsoft.com/office/powerpoint/2010/main">
+    <mc:Choice Requires="p14">
       <p:transition spd="med" p14:dur="700">
         <p:fade/>
       </p:transition>
     </mc:Choice>
-    <mc:Fallback>
+    <mc:Fallback xmlns="">
       <p:transition spd="med">
         <p:fade/>
       </p:transition>
@@ -5546,7 +5646,7 @@
           <a:p>
             <a:r>
               <a:rPr lang="en-US" dirty="0" smtClean="0"/>
-              <a:t>Homework – part 1</a:t>
+              <a:t>Homework – part 2</a:t>
             </a:r>
             <a:endParaRPr lang="en-US" dirty="0"/>
           </a:p>
@@ -5564,9 +5664,7 @@
         </p:nvSpPr>
         <p:spPr/>
         <p:txBody>
-          <a:bodyPr>
-            <a:normAutofit/>
-          </a:bodyPr>
+          <a:bodyPr/>
           <a:lstStyle/>
           <a:p>
             <a:pPr marL="514350" indent="-514350">
@@ -5583,64 +5681,32 @@
               <a:buAutoNum type="arabicPeriod"/>
             </a:pPr>
             <a:r>
-              <a:rPr lang="en-US" dirty="0" smtClean="0"/>
-              <a:t>Watch 3 </a:t>
-            </a:r>
-            <a:r>
-              <a:rPr lang="en-US" dirty="0" smtClean="0"/>
-              <a:t>Project Videos submitted for Harvard’s CS109 (search YouTube for “CS109”). Email </a:t>
-            </a:r>
-            <a:r>
-              <a:rPr lang="en-US" dirty="0" smtClean="0">
+              <a:rPr lang="en-US" dirty="0"/>
+              <a:t>Install an RSS feed app on your mobile phone (I recommend </a:t>
+            </a:r>
+            <a:r>
+              <a:rPr lang="en-US" u="sng" dirty="0" err="1">
                 <a:hlinkClick r:id="rId2"/>
               </a:rPr>
-              <a:t>omri.allouche@gmail.com</a:t>
-            </a:r>
-            <a:r>
-              <a:rPr lang="en-US" dirty="0" smtClean="0"/>
-              <a:t> with a list of terms from each video, each marked </a:t>
-            </a:r>
-            <a:r>
-              <a:rPr lang="en-US" dirty="0" smtClean="0"/>
-              <a:t>with:</a:t>
-            </a:r>
-            <a:br>
-              <a:rPr lang="en-US" dirty="0" smtClean="0"/>
-            </a:br>
-            <a:r>
-              <a:rPr lang="en-US" sz="1800" dirty="0" smtClean="0"/>
-              <a:t>	1 </a:t>
-            </a:r>
-            <a:r>
-              <a:rPr lang="en-US" sz="1800" dirty="0" smtClean="0"/>
-              <a:t>– don’t know anything about </a:t>
-            </a:r>
-            <a:r>
-              <a:rPr lang="en-US" sz="1800" dirty="0" smtClean="0"/>
-              <a:t>it</a:t>
-            </a:r>
-            <a:br>
-              <a:rPr lang="en-US" sz="1800" dirty="0" smtClean="0"/>
-            </a:br>
-            <a:r>
-              <a:rPr lang="en-US" sz="1800" dirty="0" smtClean="0"/>
-              <a:t>	2 – have a vague idea what it </a:t>
-            </a:r>
-            <a:r>
-              <a:rPr lang="en-US" sz="1800" dirty="0" smtClean="0"/>
-              <a:t>is</a:t>
-            </a:r>
-            <a:br>
-              <a:rPr lang="en-US" sz="1800" dirty="0" smtClean="0"/>
-            </a:br>
-            <a:r>
-              <a:rPr lang="en-US" sz="1800" dirty="0" smtClean="0"/>
-              <a:t>	3 – I know it pretty </a:t>
-            </a:r>
-            <a:r>
-              <a:rPr lang="en-US" sz="1800" dirty="0" smtClean="0"/>
-              <a:t>well</a:t>
-            </a:r>
+              <a:t>Feedly</a:t>
+            </a:r>
+            <a:r>
+              <a:rPr lang="en-US" dirty="0"/>
+              <a:t>), and subscribe to the RSS feed of </a:t>
+            </a:r>
+            <a:r>
+              <a:rPr lang="en-US" u="sng" dirty="0">
+                <a:hlinkClick r:id="rId3"/>
+              </a:rPr>
+              <a:t>Analytics </a:t>
+            </a:r>
+            <a:r>
+              <a:rPr lang="en-US" u="sng" dirty="0" err="1">
+                <a:hlinkClick r:id="rId3"/>
+              </a:rPr>
+              <a:t>Vidhya</a:t>
+            </a:r>
+            <a:endParaRPr lang="en-US" dirty="0"/>
           </a:p>
           <a:p>
             <a:pPr marL="514350" indent="-514350">
@@ -5657,41 +5723,19 @@
               <a:buAutoNum type="arabicPeriod"/>
             </a:pPr>
             <a:r>
-              <a:rPr lang="en-US" dirty="0" smtClean="0"/>
-              <a:t>Complete &amp; review the </a:t>
-            </a:r>
-            <a:r>
               <a:rPr lang="en-US" dirty="0"/>
-              <a:t>Exercises </a:t>
-            </a:r>
-            <a:r>
-              <a:rPr lang="en-US" dirty="0" err="1"/>
-              <a:t>Jupyter</a:t>
-            </a:r>
-            <a:r>
-              <a:rPr lang="en-US" dirty="0"/>
-              <a:t> Notebooks for </a:t>
-            </a:r>
-            <a:r>
-              <a:rPr lang="en-US" dirty="0">
-                <a:hlinkClick r:id="rId3"/>
-              </a:rPr>
-              <a:t>Python</a:t>
-            </a:r>
-            <a:r>
-              <a:rPr lang="en-US" dirty="0"/>
-              <a:t>, </a:t>
-            </a:r>
-            <a:r>
-              <a:rPr lang="en-US" dirty="0" err="1">
+              <a:t>Subscribe to the weekly newsletter of </a:t>
+            </a:r>
+            <a:r>
+              <a:rPr lang="en-US" u="sng" dirty="0">
                 <a:hlinkClick r:id="rId4"/>
               </a:rPr>
-              <a:t>Numpy</a:t>
+              <a:t>Data Machina</a:t>
             </a:r>
             <a:endParaRPr lang="en-US" dirty="0"/>
           </a:p>
           <a:p>
-            <a:pPr marL="173736" lvl="1" indent="0">
+            <a:pPr marL="514350" indent="-514350">
               <a:lnSpc>
                 <a:spcPct val="120000"/>
               </a:lnSpc>
@@ -5701,16 +5745,111 @@
               <a:spcAft>
                 <a:spcPts val="600"/>
               </a:spcAft>
-              <a:buNone/>
+              <a:buFont typeface="+mj-lt"/>
+              <a:buAutoNum type="arabicPeriod"/>
             </a:pPr>
-            <a:endParaRPr lang="en-US" dirty="0" smtClean="0"/>
+            <a:r>
+              <a:rPr lang="en-US" dirty="0"/>
+              <a:t>Sign up to </a:t>
+            </a:r>
+            <a:r>
+              <a:rPr lang="en-US" u="sng" dirty="0">
+                <a:hlinkClick r:id="rId5"/>
+              </a:rPr>
+              <a:t>meetup.com</a:t>
+            </a:r>
+            <a:r>
+              <a:rPr lang="en-US" dirty="0"/>
+              <a:t> and join a few </a:t>
+            </a:r>
+            <a:r>
+              <a:rPr lang="en-US" dirty="0" smtClean="0"/>
+              <a:t>groups </a:t>
+            </a:r>
+            <a:r>
+              <a:rPr lang="en-US" dirty="0"/>
+              <a:t>related to data science</a:t>
+            </a:r>
+          </a:p>
+          <a:p>
+            <a:pPr marL="514350" indent="-514350">
+              <a:lnSpc>
+                <a:spcPct val="120000"/>
+              </a:lnSpc>
+              <a:spcBef>
+                <a:spcPts val="0"/>
+              </a:spcBef>
+              <a:spcAft>
+                <a:spcPts val="600"/>
+              </a:spcAft>
+              <a:buFont typeface="+mj-lt"/>
+              <a:buAutoNum type="arabicPeriod"/>
+            </a:pPr>
+            <a:r>
+              <a:rPr lang="en-US" dirty="0"/>
+              <a:t>Read "</a:t>
+            </a:r>
+            <a:r>
+              <a:rPr lang="en-US" u="sng" dirty="0">
+                <a:hlinkClick r:id="rId6"/>
+              </a:rPr>
+              <a:t>A Few Useful Things to Know about Machine </a:t>
+            </a:r>
+            <a:r>
+              <a:rPr lang="en-US" u="sng" dirty="0" smtClean="0">
+                <a:hlinkClick r:id="rId6"/>
+              </a:rPr>
+              <a:t>Learning</a:t>
+            </a:r>
+            <a:r>
+              <a:rPr lang="en-US" dirty="0" smtClean="0"/>
+              <a:t>“</a:t>
+            </a:r>
+          </a:p>
+          <a:p>
+            <a:pPr marL="514350" indent="-514350">
+              <a:lnSpc>
+                <a:spcPct val="120000"/>
+              </a:lnSpc>
+              <a:spcBef>
+                <a:spcPts val="0"/>
+              </a:spcBef>
+              <a:spcAft>
+                <a:spcPts val="600"/>
+              </a:spcAft>
+              <a:buFont typeface="+mj-lt"/>
+              <a:buAutoNum type="arabicPeriod"/>
+            </a:pPr>
+            <a:r>
+              <a:rPr lang="en-US" dirty="0" smtClean="0"/>
+              <a:t>Watch </a:t>
+            </a:r>
+            <a:r>
+              <a:rPr lang="en-US" dirty="0" smtClean="0">
+                <a:hlinkClick r:id="rId7"/>
+              </a:rPr>
+              <a:t>“</a:t>
+            </a:r>
+            <a:r>
+              <a:rPr lang="en-US" dirty="0">
+                <a:hlinkClick r:id="rId7"/>
+              </a:rPr>
+              <a:t>Talk Data to Me: Data Visualization Best </a:t>
+            </a:r>
+            <a:r>
+              <a:rPr lang="en-US" dirty="0" smtClean="0">
+                <a:hlinkClick r:id="rId7"/>
+              </a:rPr>
+              <a:t>Practices”</a:t>
+            </a:r>
+            <a:endParaRPr lang="en-US" dirty="0"/>
           </a:p>
         </p:txBody>
       </p:sp>
     </p:spTree>
     <p:extLst>
       <p:ext uri="{BB962C8B-B14F-4D97-AF65-F5344CB8AC3E}">
-        <p14:creationId xmlns:p14="http://schemas.microsoft.com/office/powerpoint/2010/main" val="3071495404"/>
+        <p14:creationId xmlns:p14="http://schemas.microsoft.com/office/powerpoint/2010/main" val="1822705052"/>
       </p:ext>
     </p:extLst>
   </p:cSld>
@@ -5758,7 +5897,7 @@
       </p:grpSpPr>
       <p:sp>
         <p:nvSpPr>
-          <p:cNvPr id="2" name="Title 1"/>
+          <p:cNvPr id="4" name="Title 3"/>
           <p:cNvSpPr>
             <a:spLocks noGrp="1"/>
           </p:cNvSpPr>
@@ -5773,7 +5912,7 @@
           <a:p>
             <a:r>
               <a:rPr lang="en-US" dirty="0" smtClean="0"/>
-              <a:t>Homework – part 2</a:t>
+              <a:t>Python Crash Course - Review</a:t>
             </a:r>
             <a:endParaRPr lang="en-US" dirty="0"/>
           </a:p>
@@ -5781,12 +5920,12 @@
       </p:sp>
       <p:sp>
         <p:nvSpPr>
-          <p:cNvPr id="3" name="Content Placeholder 2"/>
-          <p:cNvSpPr>
-            <a:spLocks noGrp="1"/>
-          </p:cNvSpPr>
-          <p:nvPr>
-            <p:ph idx="1"/>
+          <p:cNvPr id="2" name="Text Placeholder 1"/>
+          <p:cNvSpPr>
+            <a:spLocks noGrp="1"/>
+          </p:cNvSpPr>
+          <p:nvPr>
+            <p:ph type="body" idx="1"/>
           </p:nvPr>
         </p:nvSpPr>
         <p:spPr/>
@@ -5794,189 +5933,26 @@
           <a:bodyPr/>
           <a:lstStyle/>
           <a:p>
-            <a:pPr marL="514350" indent="-514350">
-              <a:lnSpc>
-                <a:spcPct val="120000"/>
-              </a:lnSpc>
-              <a:spcBef>
-                <a:spcPts val="0"/>
-              </a:spcBef>
-              <a:spcAft>
-                <a:spcPts val="600"/>
-              </a:spcAft>
-              <a:buFont typeface="+mj-lt"/>
-              <a:buAutoNum type="arabicPeriod"/>
-            </a:pPr>
-            <a:r>
-              <a:rPr lang="en-US" dirty="0"/>
-              <a:t>Install an RSS feed app on your mobile phone (I recommend </a:t>
-            </a:r>
-            <a:r>
-              <a:rPr lang="en-US" u="sng" dirty="0" err="1">
-                <a:hlinkClick r:id="rId2"/>
-              </a:rPr>
-              <a:t>Feedly</a:t>
-            </a:r>
-            <a:r>
-              <a:rPr lang="en-US" dirty="0"/>
-              <a:t>), and subscribe to the RSS feed of </a:t>
-            </a:r>
-            <a:r>
-              <a:rPr lang="en-US" u="sng" dirty="0">
-                <a:hlinkClick r:id="rId3"/>
-              </a:rPr>
-              <a:t>Analytics </a:t>
-            </a:r>
-            <a:r>
-              <a:rPr lang="en-US" u="sng" dirty="0" err="1">
-                <a:hlinkClick r:id="rId3"/>
-              </a:rPr>
-              <a:t>Vidhya</a:t>
-            </a:r>
-            <a:endParaRPr lang="en-US" dirty="0"/>
-          </a:p>
-          <a:p>
-            <a:pPr marL="514350" indent="-514350">
-              <a:lnSpc>
-                <a:spcPct val="120000"/>
-              </a:lnSpc>
-              <a:spcBef>
-                <a:spcPts val="0"/>
-              </a:spcBef>
-              <a:spcAft>
-                <a:spcPts val="600"/>
-              </a:spcAft>
-              <a:buFont typeface="+mj-lt"/>
-              <a:buAutoNum type="arabicPeriod"/>
-            </a:pPr>
-            <a:r>
-              <a:rPr lang="en-US" dirty="0"/>
-              <a:t>Subscribe to the weekly newsletter of </a:t>
-            </a:r>
-            <a:r>
-              <a:rPr lang="en-US" u="sng" dirty="0">
-                <a:hlinkClick r:id="rId4"/>
-              </a:rPr>
-              <a:t>Data Machina</a:t>
-            </a:r>
-            <a:endParaRPr lang="en-US" dirty="0"/>
-          </a:p>
-          <a:p>
-            <a:pPr marL="514350" indent="-514350">
-              <a:lnSpc>
-                <a:spcPct val="120000"/>
-              </a:lnSpc>
-              <a:spcBef>
-                <a:spcPts val="0"/>
-              </a:spcBef>
-              <a:spcAft>
-                <a:spcPts val="600"/>
-              </a:spcAft>
-              <a:buFont typeface="+mj-lt"/>
-              <a:buAutoNum type="arabicPeriod"/>
-            </a:pPr>
-            <a:r>
-              <a:rPr lang="en-US" dirty="0"/>
-              <a:t>Sign up to </a:t>
-            </a:r>
-            <a:r>
-              <a:rPr lang="en-US" u="sng" dirty="0">
-                <a:hlinkClick r:id="rId5"/>
-              </a:rPr>
-              <a:t>meetup.com</a:t>
-            </a:r>
-            <a:r>
-              <a:rPr lang="en-US" dirty="0"/>
-              <a:t> and join a few </a:t>
-            </a:r>
             <a:r>
               <a:rPr lang="en-US" dirty="0" smtClean="0"/>
-              <a:t>groups </a:t>
-            </a:r>
-            <a:r>
-              <a:rPr lang="en-US" dirty="0"/>
-              <a:t>related to data science</a:t>
-            </a:r>
-          </a:p>
-          <a:p>
-            <a:pPr marL="514350" indent="-514350">
-              <a:lnSpc>
-                <a:spcPct val="120000"/>
-              </a:lnSpc>
-              <a:spcBef>
-                <a:spcPts val="0"/>
-              </a:spcBef>
-              <a:spcAft>
-                <a:spcPts val="600"/>
-              </a:spcAft>
-              <a:buFont typeface="+mj-lt"/>
-              <a:buAutoNum type="arabicPeriod"/>
-            </a:pPr>
-            <a:r>
-              <a:rPr lang="en-US" dirty="0"/>
-              <a:t>Read "</a:t>
-            </a:r>
-            <a:r>
-              <a:rPr lang="en-US" u="sng" dirty="0">
-                <a:hlinkClick r:id="rId6"/>
-              </a:rPr>
-              <a:t>A Few Useful Things to Know about Machine </a:t>
-            </a:r>
-            <a:r>
-              <a:rPr lang="en-US" u="sng" dirty="0" smtClean="0">
-                <a:hlinkClick r:id="rId6"/>
-              </a:rPr>
-              <a:t>Learning</a:t>
+              <a:t>Review in class of a </a:t>
+            </a:r>
+            <a:r>
+              <a:rPr lang="en-US" dirty="0" err="1" smtClean="0"/>
+              <a:t>Jupyter</a:t>
             </a:r>
             <a:r>
               <a:rPr lang="en-US" dirty="0" smtClean="0"/>
-              <a:t>“</a:t>
-            </a:r>
-          </a:p>
-          <a:p>
-            <a:pPr marL="514350" indent="-514350">
-              <a:lnSpc>
-                <a:spcPct val="120000"/>
-              </a:lnSpc>
-              <a:spcBef>
-                <a:spcPts val="0"/>
-              </a:spcBef>
-              <a:spcAft>
-                <a:spcPts val="600"/>
-              </a:spcAft>
-              <a:buFont typeface="+mj-lt"/>
-              <a:buAutoNum type="arabicPeriod"/>
-            </a:pPr>
-            <a:r>
-              <a:rPr lang="en-US" dirty="0" smtClean="0"/>
-              <a:t>Watch </a:t>
-            </a:r>
-            <a:r>
-              <a:rPr lang="en-US" dirty="0" smtClean="0">
-                <a:hlinkClick r:id="rId7"/>
-              </a:rPr>
-              <a:t>“</a:t>
-            </a:r>
-            <a:r>
-              <a:rPr lang="en-US" dirty="0">
-                <a:hlinkClick r:id="rId7"/>
-              </a:rPr>
-              <a:t>Talk Data to Me: Data Visualization Best </a:t>
-            </a:r>
-            <a:r>
-              <a:rPr lang="en-US" dirty="0" smtClean="0">
-                <a:hlinkClick r:id="rId7"/>
-              </a:rPr>
-              <a:t>Practices”</a:t>
-            </a:r>
-            <a:endParaRPr lang="en-US" dirty="0"/>
+              <a:t> Notebook.</a:t>
+            </a:r>
+            <a:endParaRPr lang="he-IL" dirty="0"/>
           </a:p>
         </p:txBody>
       </p:sp>
     </p:spTree>
     <p:extLst>
       <p:ext uri="{BB962C8B-B14F-4D97-AF65-F5344CB8AC3E}">
-        <p14:creationId xmlns:p14="http://schemas.microsoft.com/office/powerpoint/2010/main" val="1822705052"/>
+        <p14:creationId xmlns:p14="http://schemas.microsoft.com/office/powerpoint/2010/main" val="307297003"/>
       </p:ext>
     </p:extLst>
   </p:cSld>

</xml_diff>